<commit_message>
New code based on MSolve.Edu
</commit_message>
<xml_diff>
--- a/documentation/Presentation 2 - distributed linear algebra.pptx
+++ b/documentation/Presentation 2 - distributed linear algebra.pptx
@@ -5,10 +5,10 @@
     <p:sldMasterId id="2147483679" r:id="rId1"/>
   </p:sldMasterIdLst>
   <p:notesMasterIdLst>
-    <p:notesMasterId r:id="rId12"/>
+    <p:notesMasterId r:id="rId13"/>
   </p:notesMasterIdLst>
   <p:handoutMasterIdLst>
-    <p:handoutMasterId r:id="rId13"/>
+    <p:handoutMasterId r:id="rId14"/>
   </p:handoutMasterIdLst>
   <p:sldIdLst>
     <p:sldId id="256" r:id="rId2"/>
@@ -21,6 +21,7 @@
     <p:sldId id="303" r:id="rId9"/>
     <p:sldId id="304" r:id="rId10"/>
     <p:sldId id="305" r:id="rId11"/>
+    <p:sldId id="306" r:id="rId12"/>
   </p:sldIdLst>
   <p:sldSz cx="12192000" cy="6858000"/>
   <p:notesSz cx="6858000" cy="9144000"/>
@@ -134,6 +135,7 @@
             <p14:sldId id="303"/>
             <p14:sldId id="304"/>
             <p14:sldId id="305"/>
+            <p14:sldId id="306"/>
           </p14:sldIdLst>
         </p14:section>
       </p14:sectionLst>
@@ -254,7 +256,7 @@
           <a:p>
             <a:fld id="{AEC64D6E-F2A5-42B4-A03E-33B645EC2152}" type="datetimeFigureOut">
               <a:rPr lang="en-US" smtClean="0"/>
-              <a:t>14-May-20</a:t>
+              <a:t>11-Jul-23</a:t>
             </a:fld>
             <a:endParaRPr lang="en-US"/>
           </a:p>
@@ -431,7 +433,7 @@
           <a:p>
             <a:fld id="{98E622A7-7F18-4496-99E7-6AA62B4CF0EC}" type="datetimeFigureOut">
               <a:rPr lang="en-US" smtClean="0"/>
-              <a:t>14-May-20</a:t>
+              <a:t>11-Jul-23</a:t>
             </a:fld>
             <a:endParaRPr lang="en-US"/>
           </a:p>
@@ -1364,7 +1366,7 @@
         <p:spPr>
           <a:xfrm>
             <a:off x="9848674" y="6431727"/>
-            <a:ext cx="2255233" cy="400110"/>
+            <a:ext cx="1875257" cy="400110"/>
           </a:xfrm>
           <a:prstGeom prst="rect">
             <a:avLst/>
@@ -1393,13 +1395,7 @@
               <a:rPr lang="en-US" sz="2000" baseline="0" dirty="0" smtClean="0">
                 <a:latin typeface="+mn-lt"/>
               </a:rPr>
-              <a:t>15 </a:t>
-            </a:r>
-            <a:r>
-              <a:rPr lang="en-US" sz="2000" baseline="0" dirty="0">
-                <a:latin typeface="+mn-lt"/>
-              </a:rPr>
-              <a:t>May 2020</a:t>
+              <a:t>July 2023</a:t>
             </a:r>
             <a:endParaRPr lang="en-US" sz="2000" dirty="0">
               <a:latin typeface="+mn-lt"/>
@@ -1417,6 +1413,13 @@
   <p:clrMapOvr>
     <a:masterClrMapping/>
   </p:clrMapOvr>
+  <p:timing>
+    <p:tnLst>
+      <p:par>
+        <p:cTn id="1" dur="indefinite" restart="never" nodeType="tmRoot"/>
+      </p:par>
+    </p:tnLst>
+  </p:timing>
 </p:sldLayout>
 </file>
 
@@ -1575,7 +1578,7 @@
             </a:fld>
             <a:r>
               <a:rPr lang="en-US" dirty="0" smtClean="0"/>
-              <a:t>/10</a:t>
+              <a:t>/11</a:t>
             </a:r>
             <a:endParaRPr lang="en-US" dirty="0"/>
           </a:p>
@@ -1745,6 +1748,13 @@
   <p:clrMapOvr>
     <a:masterClrMapping/>
   </p:clrMapOvr>
+  <p:timing>
+    <p:tnLst>
+      <p:par>
+        <p:cTn id="1" dur="indefinite" restart="never" nodeType="tmRoot"/>
+      </p:par>
+    </p:tnLst>
+  </p:timing>
 </p:sldLayout>
 </file>
 
@@ -1924,6 +1934,13 @@
   <p:clrMapOvr>
     <a:masterClrMapping/>
   </p:clrMapOvr>
+  <p:timing>
+    <p:tnLst>
+      <p:par>
+        <p:cTn id="1" dur="indefinite" restart="never" nodeType="tmRoot"/>
+      </p:par>
+    </p:tnLst>
+  </p:timing>
 </p:sldLayout>
 </file>
 
@@ -2221,6 +2238,13 @@
   <p:clrMapOvr>
     <a:masterClrMapping/>
   </p:clrMapOvr>
+  <p:timing>
+    <p:tnLst>
+      <p:par>
+        <p:cTn id="1" dur="indefinite" restart="never" nodeType="tmRoot"/>
+      </p:par>
+    </p:tnLst>
+  </p:timing>
 </p:sldLayout>
 </file>
 
@@ -4922,6 +4946,13 @@
   <p:clrMapOvr>
     <a:masterClrMapping/>
   </p:clrMapOvr>
+  <p:timing>
+    <p:tnLst>
+      <p:par>
+        <p:cTn id="1" dur="indefinite" restart="never" nodeType="tmRoot"/>
+      </p:par>
+    </p:tnLst>
+  </p:timing>
 </p:sld>
 </file>
 
@@ -6950,11 +6981,7 @@
           <a:p>
             <a:r>
               <a:rPr lang="en-US" dirty="0" smtClean="0"/>
-              <a:t>10</a:t>
-            </a:r>
-            <a:r>
-              <a:rPr lang="en-US" dirty="0" smtClean="0"/>
-              <a:t>/10</a:t>
+              <a:t>10/11</a:t>
             </a:r>
             <a:endParaRPr lang="en-US" dirty="0"/>
           </a:p>
@@ -6970,6 +6997,299 @@
   <p:clrMapOvr>
     <a:masterClrMapping/>
   </p:clrMapOvr>
+  <p:timing>
+    <p:tnLst>
+      <p:par>
+        <p:cTn id="1" dur="indefinite" restart="never" nodeType="tmRoot"/>
+      </p:par>
+    </p:tnLst>
+  </p:timing>
+</p:sld>
+</file>
+
+<file path=ppt/slides/slide11.xml><?xml version="1.0" encoding="utf-8"?>
+<p:sld xmlns:a="http://schemas.openxmlformats.org/drawingml/2006/main" xmlns:r="http://schemas.openxmlformats.org/officeDocument/2006/relationships" xmlns:p="http://schemas.openxmlformats.org/presentationml/2006/main">
+  <p:cSld>
+    <p:spTree>
+      <p:nvGrpSpPr>
+        <p:cNvPr id="1" name=""/>
+        <p:cNvGrpSpPr/>
+        <p:nvPr/>
+      </p:nvGrpSpPr>
+      <p:grpSpPr>
+        <a:xfrm>
+          <a:off x="0" y="0"/>
+          <a:ext cx="0" cy="0"/>
+          <a:chOff x="0" y="0"/>
+          <a:chExt cx="0" cy="0"/>
+        </a:xfrm>
+      </p:grpSpPr>
+      <p:sp>
+        <p:nvSpPr>
+          <p:cNvPr id="5" name="Title 1"/>
+          <p:cNvSpPr>
+            <a:spLocks noGrp="1"/>
+          </p:cNvSpPr>
+          <p:nvPr>
+            <p:ph type="title"/>
+          </p:nvPr>
+        </p:nvSpPr>
+        <p:spPr>
+          <a:xfrm>
+            <a:off x="1797374" y="0"/>
+            <a:ext cx="7886700" cy="612573"/>
+          </a:xfrm>
+        </p:spPr>
+        <p:txBody>
+          <a:bodyPr>
+            <a:normAutofit/>
+          </a:bodyPr>
+          <a:lstStyle/>
+          <a:p>
+            <a:pPr algn="ctr"/>
+            <a:r>
+              <a:rPr lang="en-US" b="1" dirty="0" smtClean="0">
+                <a:latin typeface="+mn-lt"/>
+              </a:rPr>
+              <a:t>FEM example: truss structure</a:t>
+            </a:r>
+            <a:endParaRPr lang="en-US" b="1" dirty="0">
+              <a:latin typeface="+mn-lt"/>
+            </a:endParaRPr>
+          </a:p>
+        </p:txBody>
+      </p:sp>
+      <mc:AlternateContent xmlns:mc="http://schemas.openxmlformats.org/markup-compatibility/2006">
+        <mc:Choice xmlns:a14="http://schemas.microsoft.com/office/drawing/2010/main" Requires="a14">
+          <p:sp>
+            <p:nvSpPr>
+              <p:cNvPr id="3" name="TextBox 2"/>
+              <p:cNvSpPr txBox="1"/>
+              <p:nvPr/>
+            </p:nvSpPr>
+            <p:spPr>
+              <a:xfrm>
+                <a:off x="181154" y="4300399"/>
+                <a:ext cx="7383881" cy="2031325"/>
+              </a:xfrm>
+              <a:prstGeom prst="rect">
+                <a:avLst/>
+              </a:prstGeom>
+              <a:noFill/>
+            </p:spPr>
+            <p:txBody>
+              <a:bodyPr wrap="none" rtlCol="0">
+                <a:spAutoFit/>
+              </a:bodyPr>
+              <a:lstStyle/>
+              <a:p>
+                <a:pPr marL="285750" indent="-285750">
+                  <a:spcAft>
+                    <a:spcPts val="1200"/>
+                  </a:spcAft>
+                  <a:buFont typeface="Arial" panose="020B0604020202020204" pitchFamily="34" charset="0"/>
+                  <a:buChar char="•"/>
+                </a:pPr>
+                <a:r>
+                  <a:rPr lang="en-US" sz="2400" dirty="0" smtClean="0"/>
+                  <a:t>Simple linear static analysis</a:t>
+                </a:r>
+              </a:p>
+              <a:p>
+                <a:pPr marL="285750" indent="-285750">
+                  <a:spcAft>
+                    <a:spcPts val="1200"/>
+                  </a:spcAft>
+                  <a:buFont typeface="Arial" panose="020B0604020202020204" pitchFamily="34" charset="0"/>
+                  <a:buChar char="•"/>
+                </a:pPr>
+                <a:r>
+                  <a:rPr lang="en-US" sz="2400" dirty="0" smtClean="0"/>
+                  <a:t>Create the model and linear system using </a:t>
+                </a:r>
+                <a:r>
+                  <a:rPr lang="en-US" sz="2400" dirty="0" err="1" smtClean="0"/>
+                  <a:t>MSolve.Edu</a:t>
+                </a:r>
+                <a:endParaRPr lang="en-US" sz="2400" dirty="0" smtClean="0"/>
+              </a:p>
+              <a:p>
+                <a:pPr marL="285750" indent="-285750">
+                  <a:spcAft>
+                    <a:spcPts val="1200"/>
+                  </a:spcAft>
+                  <a:buFont typeface="Arial" panose="020B0604020202020204" pitchFamily="34" charset="0"/>
+                  <a:buChar char="•"/>
+                </a:pPr>
+                <a:r>
+                  <a:rPr lang="en-US" sz="2400" dirty="0" smtClean="0"/>
+                  <a:t>Convert the linear system </a:t>
+                </a:r>
+                <a14:m>
+                  <m:oMath xmlns:m="http://schemas.openxmlformats.org/officeDocument/2006/math">
+                    <m:r>
+                      <a:rPr lang="en-US" sz="2400" b="1" i="1">
+                        <a:latin typeface="Cambria Math" panose="02040503050406030204" pitchFamily="18" charset="0"/>
+                      </a:rPr>
+                      <m:t>𝑨𝒙</m:t>
+                    </m:r>
+                    <m:r>
+                      <a:rPr lang="en-US" sz="2400" b="1" i="1">
+                        <a:latin typeface="Cambria Math" panose="02040503050406030204" pitchFamily="18" charset="0"/>
+                      </a:rPr>
+                      <m:t>=</m:t>
+                    </m:r>
+                    <m:r>
+                      <a:rPr lang="en-US" sz="2400" b="1" i="1">
+                        <a:latin typeface="Cambria Math" panose="02040503050406030204" pitchFamily="18" charset="0"/>
+                      </a:rPr>
+                      <m:t>𝒃</m:t>
+                    </m:r>
+                  </m:oMath>
+                </a14:m>
+                <a:r>
+                  <a:rPr lang="en-US" sz="2400" dirty="0" smtClean="0"/>
+                  <a:t> to distributed format</a:t>
+                </a:r>
+                <a:endParaRPr lang="en-US" sz="2400" dirty="0" smtClean="0"/>
+              </a:p>
+              <a:p>
+                <a:pPr marL="285750" indent="-285750">
+                  <a:spcAft>
+                    <a:spcPts val="1200"/>
+                  </a:spcAft>
+                  <a:buFont typeface="Arial" panose="020B0604020202020204" pitchFamily="34" charset="0"/>
+                  <a:buChar char="•"/>
+                </a:pPr>
+                <a:r>
+                  <a:rPr lang="en-US" sz="2400" dirty="0" smtClean="0"/>
+                  <a:t>Solve the linear system using PCG-MPI</a:t>
+                </a:r>
+                <a:endParaRPr lang="en-US" sz="2400" b="1" dirty="0" smtClean="0"/>
+              </a:p>
+            </p:txBody>
+          </p:sp>
+        </mc:Choice>
+        <mc:Fallback>
+          <p:sp>
+            <p:nvSpPr>
+              <p:cNvPr id="3" name="TextBox 2"/>
+              <p:cNvSpPr txBox="1">
+                <a:spLocks noRot="1" noChangeAspect="1" noMove="1" noResize="1" noEditPoints="1" noAdjustHandles="1" noChangeArrowheads="1" noChangeShapeType="1" noTextEdit="1"/>
+              </p:cNvSpPr>
+              <p:nvPr/>
+            </p:nvSpPr>
+            <p:spPr>
+              <a:xfrm>
+                <a:off x="181154" y="4300399"/>
+                <a:ext cx="7383881" cy="2031325"/>
+              </a:xfrm>
+              <a:prstGeom prst="rect">
+                <a:avLst/>
+              </a:prstGeom>
+              <a:blipFill>
+                <a:blip r:embed="rId2"/>
+                <a:stretch>
+                  <a:fillRect l="-1156" t="-2395" r="-248" b="-5689"/>
+                </a:stretch>
+              </a:blipFill>
+            </p:spPr>
+            <p:txBody>
+              <a:bodyPr/>
+              <a:lstStyle/>
+              <a:p>
+                <a:r>
+                  <a:rPr lang="en-US">
+                    <a:noFill/>
+                  </a:rPr>
+                  <a:t> </a:t>
+                </a:r>
+              </a:p>
+            </p:txBody>
+          </p:sp>
+        </mc:Fallback>
+      </mc:AlternateContent>
+      <p:sp>
+        <p:nvSpPr>
+          <p:cNvPr id="7" name="Slide Number Placeholder 1">
+            <a:extLst>
+              <a:ext uri="{FF2B5EF4-FFF2-40B4-BE49-F238E27FC236}">
+                <a16:creationId xmlns:a16="http://schemas.microsoft.com/office/drawing/2014/main" id="{1A88AB5F-7BE6-40DE-B492-4ED07ED5753C}"/>
+              </a:ext>
+            </a:extLst>
+          </p:cNvPr>
+          <p:cNvSpPr>
+            <a:spLocks noGrp="1"/>
+          </p:cNvSpPr>
+          <p:nvPr>
+            <p:ph type="sldNum" sz="quarter" idx="12"/>
+          </p:nvPr>
+        </p:nvSpPr>
+        <p:spPr>
+          <a:xfrm>
+            <a:off x="9448800" y="6438106"/>
+            <a:ext cx="2743200" cy="365125"/>
+          </a:xfrm>
+        </p:spPr>
+        <p:txBody>
+          <a:bodyPr/>
+          <a:lstStyle/>
+          <a:p>
+            <a:r>
+              <a:rPr lang="en-US" dirty="0" smtClean="0"/>
+              <a:t>11/11</a:t>
+            </a:r>
+            <a:endParaRPr lang="en-US" dirty="0"/>
+          </a:p>
+        </p:txBody>
+      </p:sp>
+      <p:pic>
+        <p:nvPicPr>
+          <p:cNvPr id="2" name="Picture 1"/>
+          <p:cNvPicPr>
+            <a:picLocks noChangeAspect="1"/>
+          </p:cNvPicPr>
+          <p:nvPr/>
+        </p:nvPicPr>
+        <p:blipFill>
+          <a:blip r:embed="rId3">
+            <a:extLst>
+              <a:ext uri="{28A0092B-C50C-407E-A947-70E740481C1C}">
+                <a14:useLocalDpi xmlns:a14="http://schemas.microsoft.com/office/drawing/2010/main" val="0"/>
+              </a:ext>
+            </a:extLst>
+          </a:blip>
+          <a:stretch>
+            <a:fillRect/>
+          </a:stretch>
+        </p:blipFill>
+        <p:spPr>
+          <a:xfrm>
+            <a:off x="1717130" y="767751"/>
+            <a:ext cx="9106178" cy="3377470"/>
+          </a:xfrm>
+          <a:prstGeom prst="rect">
+            <a:avLst/>
+          </a:prstGeom>
+        </p:spPr>
+      </p:pic>
+    </p:spTree>
+    <p:extLst>
+      <p:ext uri="{BB962C8B-B14F-4D97-AF65-F5344CB8AC3E}">
+        <p14:creationId xmlns:p14="http://schemas.microsoft.com/office/powerpoint/2010/main" val="9161790"/>
+      </p:ext>
+    </p:extLst>
+  </p:cSld>
+  <p:clrMapOvr>
+    <a:masterClrMapping/>
+  </p:clrMapOvr>
+  <p:timing>
+    <p:tnLst>
+      <p:par>
+        <p:cTn id="1" dur="indefinite" restart="never" nodeType="tmRoot"/>
+      </p:par>
+    </p:tnLst>
+  </p:timing>
 </p:sld>
 </file>
 
@@ -7018,7 +7338,7 @@
             </a:fld>
             <a:r>
               <a:rPr lang="en-US" dirty="0" smtClean="0"/>
-              <a:t>/10</a:t>
+              <a:t>/11</a:t>
             </a:r>
             <a:endParaRPr lang="en-US" dirty="0"/>
           </a:p>
@@ -7326,6 +7646,13 @@
   <p:clrMapOvr>
     <a:masterClrMapping/>
   </p:clrMapOvr>
+  <p:timing>
+    <p:tnLst>
+      <p:par>
+        <p:cTn id="1" dur="indefinite" restart="never" nodeType="tmRoot"/>
+      </p:par>
+    </p:tnLst>
+  </p:timing>
 </p:sld>
 </file>
 
@@ -8219,12 +8546,8 @@
           <a:lstStyle/>
           <a:p>
             <a:r>
-              <a:rPr lang="en-US" dirty="0"/>
-              <a:t>3</a:t>
-            </a:r>
-            <a:r>
               <a:rPr lang="en-US" dirty="0" smtClean="0"/>
-              <a:t>/10</a:t>
+              <a:t>3/11</a:t>
             </a:r>
             <a:endParaRPr lang="en-US" dirty="0"/>
           </a:p>
@@ -8240,6 +8563,13 @@
   <p:clrMapOvr>
     <a:masterClrMapping/>
   </p:clrMapOvr>
+  <p:timing>
+    <p:tnLst>
+      <p:par>
+        <p:cTn id="1" dur="indefinite" restart="never" nodeType="tmRoot"/>
+      </p:par>
+    </p:tnLst>
+  </p:timing>
 </p:sld>
 </file>
 
@@ -9317,12 +9647,8 @@
           <a:lstStyle/>
           <a:p>
             <a:r>
-              <a:rPr lang="en-US" dirty="0"/>
-              <a:t>4</a:t>
-            </a:r>
-            <a:r>
               <a:rPr lang="en-US" dirty="0" smtClean="0"/>
-              <a:t>/10</a:t>
+              <a:t>4/11</a:t>
             </a:r>
             <a:endParaRPr lang="en-US" dirty="0"/>
           </a:p>
@@ -9338,6 +9664,13 @@
   <p:clrMapOvr>
     <a:masterClrMapping/>
   </p:clrMapOvr>
+  <p:timing>
+    <p:tnLst>
+      <p:par>
+        <p:cTn id="1" dur="indefinite" restart="never" nodeType="tmRoot"/>
+      </p:par>
+    </p:tnLst>
+  </p:timing>
 </p:sld>
 </file>
 
@@ -11145,7 +11478,7 @@
           <a:p>
             <a:r>
               <a:rPr lang="en-US" dirty="0" smtClean="0"/>
-              <a:t>5/10</a:t>
+              <a:t>5/11</a:t>
             </a:r>
             <a:endParaRPr lang="en-US" dirty="0"/>
           </a:p>
@@ -11161,6 +11494,13 @@
   <p:clrMapOvr>
     <a:masterClrMapping/>
   </p:clrMapOvr>
+  <p:timing>
+    <p:tnLst>
+      <p:par>
+        <p:cTn id="1" dur="indefinite" restart="never" nodeType="tmRoot"/>
+      </p:par>
+    </p:tnLst>
+  </p:timing>
 </p:sld>
 </file>
 
@@ -13081,12 +13421,8 @@
           <a:lstStyle/>
           <a:p>
             <a:r>
-              <a:rPr lang="en-US" dirty="0"/>
-              <a:t>6</a:t>
-            </a:r>
-            <a:r>
               <a:rPr lang="en-US" dirty="0" smtClean="0"/>
-              <a:t>/10</a:t>
+              <a:t>6/11</a:t>
             </a:r>
             <a:endParaRPr lang="en-US" dirty="0"/>
           </a:p>
@@ -13102,6 +13438,13 @@
   <p:clrMapOvr>
     <a:masterClrMapping/>
   </p:clrMapOvr>
+  <p:timing>
+    <p:tnLst>
+      <p:par>
+        <p:cTn id="1" dur="indefinite" restart="never" nodeType="tmRoot"/>
+      </p:par>
+    </p:tnLst>
+  </p:timing>
 </p:sld>
 </file>
 
@@ -14432,7 +14775,7 @@
           <a:p>
             <a:r>
               <a:rPr lang="en-US" dirty="0" smtClean="0"/>
-              <a:t>7/10</a:t>
+              <a:t>7/11</a:t>
             </a:r>
             <a:endParaRPr lang="en-US" dirty="0"/>
           </a:p>
@@ -14448,6 +14791,13 @@
   <p:clrMapOvr>
     <a:masterClrMapping/>
   </p:clrMapOvr>
+  <p:timing>
+    <p:tnLst>
+      <p:par>
+        <p:cTn id="1" dur="indefinite" restart="never" nodeType="tmRoot"/>
+      </p:par>
+    </p:tnLst>
+  </p:timing>
 </p:sld>
 </file>
 
@@ -14953,7 +15303,7 @@
           <a:p>
             <a:r>
               <a:rPr lang="en-US" dirty="0" smtClean="0"/>
-              <a:t>8/10</a:t>
+              <a:t>8/11</a:t>
             </a:r>
             <a:endParaRPr lang="en-US" dirty="0"/>
           </a:p>
@@ -14969,6 +15319,13 @@
   <p:clrMapOvr>
     <a:masterClrMapping/>
   </p:clrMapOvr>
+  <p:timing>
+    <p:tnLst>
+      <p:par>
+        <p:cTn id="1" dur="indefinite" restart="never" nodeType="tmRoot"/>
+      </p:par>
+    </p:tnLst>
+  </p:timing>
 </p:sld>
 </file>
 
@@ -15766,7 +16123,7 @@
           <a:p>
             <a:r>
               <a:rPr lang="en-US" dirty="0" smtClean="0"/>
-              <a:t>9/10</a:t>
+              <a:t>9/11</a:t>
             </a:r>
             <a:endParaRPr lang="en-US" dirty="0"/>
           </a:p>
@@ -15782,6 +16139,13 @@
   <p:clrMapOvr>
     <a:masterClrMapping/>
   </p:clrMapOvr>
+  <p:timing>
+    <p:tnLst>
+      <p:par>
+        <p:cTn id="1" dur="indefinite" restart="never" nodeType="tmRoot"/>
+      </p:par>
+    </p:tnLst>
+  </p:timing>
 </p:sld>
 </file>
 

</xml_diff>